<commit_message>
feats. SPI & heartbeat
</commit_message>
<xml_diff>
--- a/Bobby-RPC-Framework/Bobby-MyRPC/Figures.pptx
+++ b/Bobby-RPC-Framework/Bobby-MyRPC/Figures.pptx
@@ -261,7 +261,7 @@
           <a:p>
             <a:fld id="{178A2B6C-FC36-4AAD-B7F4-11174968DEAA}" type="datetimeFigureOut">
               <a:rPr lang="zh-CN" altLang="en-US" smtClean="0"/>
-              <a:t>2025/3/31</a:t>
+              <a:t>2025/4/1</a:t>
             </a:fld>
             <a:endParaRPr lang="zh-CN" altLang="en-US"/>
           </a:p>
@@ -459,7 +459,7 @@
           <a:p>
             <a:fld id="{178A2B6C-FC36-4AAD-B7F4-11174968DEAA}" type="datetimeFigureOut">
               <a:rPr lang="zh-CN" altLang="en-US" smtClean="0"/>
-              <a:t>2025/3/31</a:t>
+              <a:t>2025/4/1</a:t>
             </a:fld>
             <a:endParaRPr lang="zh-CN" altLang="en-US"/>
           </a:p>
@@ -667,7 +667,7 @@
           <a:p>
             <a:fld id="{178A2B6C-FC36-4AAD-B7F4-11174968DEAA}" type="datetimeFigureOut">
               <a:rPr lang="zh-CN" altLang="en-US" smtClean="0"/>
-              <a:t>2025/3/31</a:t>
+              <a:t>2025/4/1</a:t>
             </a:fld>
             <a:endParaRPr lang="zh-CN" altLang="en-US"/>
           </a:p>
@@ -865,7 +865,7 @@
           <a:p>
             <a:fld id="{178A2B6C-FC36-4AAD-B7F4-11174968DEAA}" type="datetimeFigureOut">
               <a:rPr lang="zh-CN" altLang="en-US" smtClean="0"/>
-              <a:t>2025/3/31</a:t>
+              <a:t>2025/4/1</a:t>
             </a:fld>
             <a:endParaRPr lang="zh-CN" altLang="en-US"/>
           </a:p>
@@ -1140,7 +1140,7 @@
           <a:p>
             <a:fld id="{178A2B6C-FC36-4AAD-B7F4-11174968DEAA}" type="datetimeFigureOut">
               <a:rPr lang="zh-CN" altLang="en-US" smtClean="0"/>
-              <a:t>2025/3/31</a:t>
+              <a:t>2025/4/1</a:t>
             </a:fld>
             <a:endParaRPr lang="zh-CN" altLang="en-US"/>
           </a:p>
@@ -1405,7 +1405,7 @@
           <a:p>
             <a:fld id="{178A2B6C-FC36-4AAD-B7F4-11174968DEAA}" type="datetimeFigureOut">
               <a:rPr lang="zh-CN" altLang="en-US" smtClean="0"/>
-              <a:t>2025/3/31</a:t>
+              <a:t>2025/4/1</a:t>
             </a:fld>
             <a:endParaRPr lang="zh-CN" altLang="en-US"/>
           </a:p>
@@ -1817,7 +1817,7 @@
           <a:p>
             <a:fld id="{178A2B6C-FC36-4AAD-B7F4-11174968DEAA}" type="datetimeFigureOut">
               <a:rPr lang="zh-CN" altLang="en-US" smtClean="0"/>
-              <a:t>2025/3/31</a:t>
+              <a:t>2025/4/1</a:t>
             </a:fld>
             <a:endParaRPr lang="zh-CN" altLang="en-US"/>
           </a:p>
@@ -1958,7 +1958,7 @@
           <a:p>
             <a:fld id="{178A2B6C-FC36-4AAD-B7F4-11174968DEAA}" type="datetimeFigureOut">
               <a:rPr lang="zh-CN" altLang="en-US" smtClean="0"/>
-              <a:t>2025/3/31</a:t>
+              <a:t>2025/4/1</a:t>
             </a:fld>
             <a:endParaRPr lang="zh-CN" altLang="en-US"/>
           </a:p>
@@ -2071,7 +2071,7 @@
           <a:p>
             <a:fld id="{178A2B6C-FC36-4AAD-B7F4-11174968DEAA}" type="datetimeFigureOut">
               <a:rPr lang="zh-CN" altLang="en-US" smtClean="0"/>
-              <a:t>2025/3/31</a:t>
+              <a:t>2025/4/1</a:t>
             </a:fld>
             <a:endParaRPr lang="zh-CN" altLang="en-US"/>
           </a:p>
@@ -2382,7 +2382,7 @@
           <a:p>
             <a:fld id="{178A2B6C-FC36-4AAD-B7F4-11174968DEAA}" type="datetimeFigureOut">
               <a:rPr lang="zh-CN" altLang="en-US" smtClean="0"/>
-              <a:t>2025/3/31</a:t>
+              <a:t>2025/4/1</a:t>
             </a:fld>
             <a:endParaRPr lang="zh-CN" altLang="en-US"/>
           </a:p>
@@ -2670,7 +2670,7 @@
           <a:p>
             <a:fld id="{178A2B6C-FC36-4AAD-B7F4-11174968DEAA}" type="datetimeFigureOut">
               <a:rPr lang="zh-CN" altLang="en-US" smtClean="0"/>
-              <a:t>2025/3/31</a:t>
+              <a:t>2025/4/1</a:t>
             </a:fld>
             <a:endParaRPr lang="zh-CN" altLang="en-US"/>
           </a:p>
@@ -2911,7 +2911,7 @@
           <a:p>
             <a:fld id="{178A2B6C-FC36-4AAD-B7F4-11174968DEAA}" type="datetimeFigureOut">
               <a:rPr lang="zh-CN" altLang="en-US" smtClean="0"/>
-              <a:t>2025/3/31</a:t>
+              <a:t>2025/4/1</a:t>
             </a:fld>
             <a:endParaRPr lang="zh-CN" altLang="en-US"/>
           </a:p>
@@ -5373,10 +5373,10 @@
       </p:grpSpPr>
       <p:sp>
         <p:nvSpPr>
-          <p:cNvPr id="2" name="矩形: 圆角 1">
-            <a:extLst>
-              <a:ext uri="{FF2B5EF4-FFF2-40B4-BE49-F238E27FC236}">
-                <a16:creationId xmlns:a16="http://schemas.microsoft.com/office/drawing/2014/main" id="{3105D304-F2AD-403A-9389-0735D5C4ABA7}"/>
+          <p:cNvPr id="5" name="矩形: 圆角 4">
+            <a:extLst>
+              <a:ext uri="{FF2B5EF4-FFF2-40B4-BE49-F238E27FC236}">
+                <a16:creationId xmlns:a16="http://schemas.microsoft.com/office/drawing/2014/main" id="{3CA38547-562F-4F1F-9AFF-AC9D96699066}"/>
               </a:ext>
             </a:extLst>
           </p:cNvPr>
@@ -5385,8 +5385,8 @@
         </p:nvSpPr>
         <p:spPr>
           <a:xfrm>
-            <a:off x="228600" y="2841172"/>
-            <a:ext cx="2762794" cy="3683725"/>
+            <a:off x="1436116" y="1274923"/>
+            <a:ext cx="1654499" cy="725894"/>
           </a:xfrm>
           <a:prstGeom prst="roundRect">
             <a:avLst/>
@@ -5419,16 +5419,20 @@
           <a:lstStyle/>
           <a:p>
             <a:pPr algn="ctr"/>
-            <a:endParaRPr lang="zh-CN" altLang="en-US"/>
-          </a:p>
-        </p:txBody>
-      </p:sp>
-      <p:sp>
-        <p:nvSpPr>
-          <p:cNvPr id="5" name="矩形: 圆角 4">
-            <a:extLst>
-              <a:ext uri="{FF2B5EF4-FFF2-40B4-BE49-F238E27FC236}">
-                <a16:creationId xmlns:a16="http://schemas.microsoft.com/office/drawing/2014/main" id="{3CA38547-562F-4F1F-9AFF-AC9D96699066}"/>
+            <a:r>
+              <a:rPr lang="en-US" altLang="zh-CN" dirty="0"/>
+              <a:t>Client</a:t>
+            </a:r>
+            <a:endParaRPr lang="zh-CN" altLang="en-US" dirty="0"/>
+          </a:p>
+        </p:txBody>
+      </p:sp>
+      <p:sp>
+        <p:nvSpPr>
+          <p:cNvPr id="8" name="矩形: 圆角 7">
+            <a:extLst>
+              <a:ext uri="{FF2B5EF4-FFF2-40B4-BE49-F238E27FC236}">
+                <a16:creationId xmlns:a16="http://schemas.microsoft.com/office/drawing/2014/main" id="{D8180B50-E2BC-4EE3-8D4B-486464765B79}"/>
               </a:ext>
             </a:extLst>
           </p:cNvPr>
@@ -5437,8 +5441,8 @@
         </p:nvSpPr>
         <p:spPr>
           <a:xfrm>
-            <a:off x="9200606" y="2841171"/>
-            <a:ext cx="2762794" cy="3683725"/>
+            <a:off x="7715837" y="1274923"/>
+            <a:ext cx="1654499" cy="725894"/>
           </a:xfrm>
           <a:prstGeom prst="roundRect">
             <a:avLst/>
@@ -5471,41 +5475,65 @@
           <a:lstStyle/>
           <a:p>
             <a:pPr algn="ctr"/>
-            <a:endParaRPr lang="zh-CN" altLang="en-US"/>
-          </a:p>
-        </p:txBody>
-      </p:sp>
-      <p:sp>
-        <p:nvSpPr>
-          <p:cNvPr id="6" name="文本框 5">
-            <a:extLst>
-              <a:ext uri="{FF2B5EF4-FFF2-40B4-BE49-F238E27FC236}">
-                <a16:creationId xmlns:a16="http://schemas.microsoft.com/office/drawing/2014/main" id="{F1A03740-748D-4D84-B1D4-4DA373E75E50}"/>
-              </a:ext>
-            </a:extLst>
-          </p:cNvPr>
-          <p:cNvSpPr txBox="1"/>
+            <a:r>
+              <a:rPr lang="en-US" altLang="zh-CN" dirty="0"/>
+              <a:t>Server</a:t>
+            </a:r>
+            <a:endParaRPr lang="zh-CN" altLang="en-US" dirty="0"/>
+          </a:p>
+        </p:txBody>
+      </p:sp>
+      <p:sp>
+        <p:nvSpPr>
+          <p:cNvPr id="9" name="矩形: 圆角 8">
+            <a:extLst>
+              <a:ext uri="{FF2B5EF4-FFF2-40B4-BE49-F238E27FC236}">
+                <a16:creationId xmlns:a16="http://schemas.microsoft.com/office/drawing/2014/main" id="{1DA4A3FF-0ACA-4B34-BDBA-BE08480315F2}"/>
+              </a:ext>
+            </a:extLst>
+          </p:cNvPr>
+          <p:cNvSpPr/>
           <p:nvPr/>
         </p:nvSpPr>
         <p:spPr>
           <a:xfrm>
-            <a:off x="724989" y="346166"/>
-            <a:ext cx="3997234" cy="369332"/>
+            <a:off x="1436116" y="2370392"/>
+            <a:ext cx="1654499" cy="725894"/>
           </a:xfrm>
-          <a:prstGeom prst="rect">
+          <a:prstGeom prst="roundRect">
             <a:avLst/>
           </a:prstGeom>
-          <a:noFill/>
+          <a:solidFill>
+            <a:schemeClr val="accent2">
+              <a:alpha val="50000"/>
+            </a:schemeClr>
+          </a:solidFill>
+          <a:ln>
+            <a:noFill/>
+          </a:ln>
         </p:spPr>
-        <p:txBody>
-          <a:bodyPr wrap="square" rtlCol="0">
-            <a:spAutoFit/>
-          </a:bodyPr>
-          <a:lstStyle/>
-          <a:p>
+        <p:style>
+          <a:lnRef idx="0">
+            <a:scrgbClr r="0" g="0" b="0"/>
+          </a:lnRef>
+          <a:fillRef idx="0">
+            <a:scrgbClr r="0" g="0" b="0"/>
+          </a:fillRef>
+          <a:effectRef idx="0">
+            <a:scrgbClr r="0" g="0" b="0"/>
+          </a:effectRef>
+          <a:fontRef idx="minor">
+            <a:schemeClr val="lt1"/>
+          </a:fontRef>
+        </p:style>
+        <p:txBody>
+          <a:bodyPr rtlCol="0" anchor="ctr"/>
+          <a:lstStyle/>
+          <a:p>
+            <a:pPr algn="ctr"/>
             <a:r>
               <a:rPr lang="en-US" altLang="zh-CN" dirty="0"/>
-              <a:t>BeanPostProcessor</a:t>
+              <a:t>ClientProxy</a:t>
             </a:r>
             <a:endParaRPr lang="zh-CN" altLang="en-US" dirty="0"/>
           </a:p>
@@ -5513,37 +5541,331 @@
       </p:sp>
       <p:sp>
         <p:nvSpPr>
-          <p:cNvPr id="7" name="文本框 6">
-            <a:extLst>
-              <a:ext uri="{FF2B5EF4-FFF2-40B4-BE49-F238E27FC236}">
-                <a16:creationId xmlns:a16="http://schemas.microsoft.com/office/drawing/2014/main" id="{ECCE4B86-F781-4041-91E1-30E1F032224F}"/>
-              </a:ext>
-            </a:extLst>
-          </p:cNvPr>
-          <p:cNvSpPr txBox="1"/>
+          <p:cNvPr id="10" name="矩形: 圆角 9">
+            <a:extLst>
+              <a:ext uri="{FF2B5EF4-FFF2-40B4-BE49-F238E27FC236}">
+                <a16:creationId xmlns:a16="http://schemas.microsoft.com/office/drawing/2014/main" id="{E608DEB4-CF1A-4752-AAC1-8C71B427AE48}"/>
+              </a:ext>
+            </a:extLst>
+          </p:cNvPr>
+          <p:cNvSpPr/>
           <p:nvPr/>
         </p:nvSpPr>
         <p:spPr>
           <a:xfrm>
-            <a:off x="724989" y="986246"/>
-            <a:ext cx="3997234" cy="369332"/>
+            <a:off x="1436116" y="4648147"/>
+            <a:ext cx="1654499" cy="418073"/>
           </a:xfrm>
-          <a:prstGeom prst="rect">
+          <a:prstGeom prst="roundRect">
             <a:avLst/>
           </a:prstGeom>
-          <a:noFill/>
+          <a:solidFill>
+            <a:schemeClr val="accent2">
+              <a:alpha val="50000"/>
+            </a:schemeClr>
+          </a:solidFill>
+          <a:ln>
+            <a:noFill/>
+          </a:ln>
         </p:spPr>
-        <p:txBody>
-          <a:bodyPr wrap="square" rtlCol="0">
-            <a:spAutoFit/>
-          </a:bodyPr>
-          <a:lstStyle/>
-          <a:p>
-            <a:r>
-              <a:rPr lang="en-US" altLang="zh-CN" dirty="0"/>
-              <a:t>BeanPostProcessor</a:t>
-            </a:r>
-            <a:endParaRPr lang="zh-CN" altLang="en-US" dirty="0"/>
+        <p:style>
+          <a:lnRef idx="0">
+            <a:scrgbClr r="0" g="0" b="0"/>
+          </a:lnRef>
+          <a:fillRef idx="0">
+            <a:scrgbClr r="0" g="0" b="0"/>
+          </a:fillRef>
+          <a:effectRef idx="0">
+            <a:scrgbClr r="0" g="0" b="0"/>
+          </a:effectRef>
+          <a:fontRef idx="minor">
+            <a:schemeClr val="lt1"/>
+          </a:fontRef>
+        </p:style>
+        <p:txBody>
+          <a:bodyPr rtlCol="0" anchor="ctr"/>
+          <a:lstStyle/>
+          <a:p>
+            <a:pPr algn="ctr"/>
+            <a:r>
+              <a:rPr lang="zh-CN" altLang="en-US" dirty="0"/>
+              <a:t>序列化</a:t>
+            </a:r>
+          </a:p>
+        </p:txBody>
+      </p:sp>
+      <p:sp>
+        <p:nvSpPr>
+          <p:cNvPr id="11" name="矩形: 圆角 10">
+            <a:extLst>
+              <a:ext uri="{FF2B5EF4-FFF2-40B4-BE49-F238E27FC236}">
+                <a16:creationId xmlns:a16="http://schemas.microsoft.com/office/drawing/2014/main" id="{A2085A7B-F300-46C7-BE88-F064BC8D3CF2}"/>
+              </a:ext>
+            </a:extLst>
+          </p:cNvPr>
+          <p:cNvSpPr/>
+          <p:nvPr/>
+        </p:nvSpPr>
+        <p:spPr>
+          <a:xfrm>
+            <a:off x="1436116" y="5245675"/>
+            <a:ext cx="1654499" cy="418073"/>
+          </a:xfrm>
+          <a:prstGeom prst="roundRect">
+            <a:avLst/>
+          </a:prstGeom>
+          <a:solidFill>
+            <a:schemeClr val="accent2">
+              <a:alpha val="50000"/>
+            </a:schemeClr>
+          </a:solidFill>
+          <a:ln>
+            <a:noFill/>
+          </a:ln>
+        </p:spPr>
+        <p:style>
+          <a:lnRef idx="0">
+            <a:scrgbClr r="0" g="0" b="0"/>
+          </a:lnRef>
+          <a:fillRef idx="0">
+            <a:scrgbClr r="0" g="0" b="0"/>
+          </a:fillRef>
+          <a:effectRef idx="0">
+            <a:scrgbClr r="0" g="0" b="0"/>
+          </a:effectRef>
+          <a:fontRef idx="minor">
+            <a:schemeClr val="lt1"/>
+          </a:fontRef>
+        </p:style>
+        <p:txBody>
+          <a:bodyPr rtlCol="0" anchor="ctr"/>
+          <a:lstStyle/>
+          <a:p>
+            <a:pPr algn="ctr"/>
+            <a:r>
+              <a:rPr lang="zh-CN" altLang="en-US" dirty="0"/>
+              <a:t>协议编码</a:t>
+            </a:r>
+          </a:p>
+        </p:txBody>
+      </p:sp>
+      <p:sp>
+        <p:nvSpPr>
+          <p:cNvPr id="12" name="矩形: 圆角 11">
+            <a:extLst>
+              <a:ext uri="{FF2B5EF4-FFF2-40B4-BE49-F238E27FC236}">
+                <a16:creationId xmlns:a16="http://schemas.microsoft.com/office/drawing/2014/main" id="{2E53A2FD-6F8F-49A7-8484-2964E3ADD891}"/>
+              </a:ext>
+            </a:extLst>
+          </p:cNvPr>
+          <p:cNvSpPr/>
+          <p:nvPr/>
+        </p:nvSpPr>
+        <p:spPr>
+          <a:xfrm>
+            <a:off x="1436116" y="5843203"/>
+            <a:ext cx="1654499" cy="418073"/>
+          </a:xfrm>
+          <a:prstGeom prst="roundRect">
+            <a:avLst/>
+          </a:prstGeom>
+          <a:solidFill>
+            <a:schemeClr val="accent2">
+              <a:alpha val="50000"/>
+            </a:schemeClr>
+          </a:solidFill>
+          <a:ln>
+            <a:noFill/>
+          </a:ln>
+        </p:spPr>
+        <p:style>
+          <a:lnRef idx="0">
+            <a:scrgbClr r="0" g="0" b="0"/>
+          </a:lnRef>
+          <a:fillRef idx="0">
+            <a:scrgbClr r="0" g="0" b="0"/>
+          </a:fillRef>
+          <a:effectRef idx="0">
+            <a:scrgbClr r="0" g="0" b="0"/>
+          </a:effectRef>
+          <a:fontRef idx="minor">
+            <a:schemeClr val="lt1"/>
+          </a:fontRef>
+        </p:style>
+        <p:txBody>
+          <a:bodyPr rtlCol="0" anchor="ctr"/>
+          <a:lstStyle/>
+          <a:p>
+            <a:pPr algn="ctr"/>
+            <a:r>
+              <a:rPr lang="zh-CN" altLang="en-US" dirty="0"/>
+              <a:t>网络传输</a:t>
+            </a:r>
+          </a:p>
+        </p:txBody>
+      </p:sp>
+      <p:sp>
+        <p:nvSpPr>
+          <p:cNvPr id="13" name="矩形: 圆角 12">
+            <a:extLst>
+              <a:ext uri="{FF2B5EF4-FFF2-40B4-BE49-F238E27FC236}">
+                <a16:creationId xmlns:a16="http://schemas.microsoft.com/office/drawing/2014/main" id="{977C85EE-2A79-442C-A3A0-E93145DD171B}"/>
+              </a:ext>
+            </a:extLst>
+          </p:cNvPr>
+          <p:cNvSpPr/>
+          <p:nvPr/>
+        </p:nvSpPr>
+        <p:spPr>
+          <a:xfrm>
+            <a:off x="7637739" y="4648147"/>
+            <a:ext cx="1654499" cy="418073"/>
+          </a:xfrm>
+          <a:prstGeom prst="roundRect">
+            <a:avLst/>
+          </a:prstGeom>
+          <a:solidFill>
+            <a:schemeClr val="accent2">
+              <a:alpha val="50000"/>
+            </a:schemeClr>
+          </a:solidFill>
+          <a:ln>
+            <a:noFill/>
+          </a:ln>
+        </p:spPr>
+        <p:style>
+          <a:lnRef idx="0">
+            <a:scrgbClr r="0" g="0" b="0"/>
+          </a:lnRef>
+          <a:fillRef idx="0">
+            <a:scrgbClr r="0" g="0" b="0"/>
+          </a:fillRef>
+          <a:effectRef idx="0">
+            <a:scrgbClr r="0" g="0" b="0"/>
+          </a:effectRef>
+          <a:fontRef idx="minor">
+            <a:schemeClr val="lt1"/>
+          </a:fontRef>
+        </p:style>
+        <p:txBody>
+          <a:bodyPr rtlCol="0" anchor="ctr"/>
+          <a:lstStyle/>
+          <a:p>
+            <a:pPr algn="ctr"/>
+            <a:r>
+              <a:rPr lang="zh-CN" altLang="en-US" dirty="0"/>
+              <a:t>反序列化</a:t>
+            </a:r>
+          </a:p>
+        </p:txBody>
+      </p:sp>
+      <p:sp>
+        <p:nvSpPr>
+          <p:cNvPr id="14" name="矩形: 圆角 13">
+            <a:extLst>
+              <a:ext uri="{FF2B5EF4-FFF2-40B4-BE49-F238E27FC236}">
+                <a16:creationId xmlns:a16="http://schemas.microsoft.com/office/drawing/2014/main" id="{BB3EBAC6-9DA6-4E88-8CDE-D6760DCA12A5}"/>
+              </a:ext>
+            </a:extLst>
+          </p:cNvPr>
+          <p:cNvSpPr/>
+          <p:nvPr/>
+        </p:nvSpPr>
+        <p:spPr>
+          <a:xfrm>
+            <a:off x="7637739" y="5245675"/>
+            <a:ext cx="1654499" cy="418073"/>
+          </a:xfrm>
+          <a:prstGeom prst="roundRect">
+            <a:avLst/>
+          </a:prstGeom>
+          <a:solidFill>
+            <a:schemeClr val="accent2">
+              <a:alpha val="50000"/>
+            </a:schemeClr>
+          </a:solidFill>
+          <a:ln>
+            <a:noFill/>
+          </a:ln>
+        </p:spPr>
+        <p:style>
+          <a:lnRef idx="0">
+            <a:scrgbClr r="0" g="0" b="0"/>
+          </a:lnRef>
+          <a:fillRef idx="0">
+            <a:scrgbClr r="0" g="0" b="0"/>
+          </a:fillRef>
+          <a:effectRef idx="0">
+            <a:scrgbClr r="0" g="0" b="0"/>
+          </a:effectRef>
+          <a:fontRef idx="minor">
+            <a:schemeClr val="lt1"/>
+          </a:fontRef>
+        </p:style>
+        <p:txBody>
+          <a:bodyPr rtlCol="0" anchor="ctr"/>
+          <a:lstStyle/>
+          <a:p>
+            <a:pPr algn="ctr"/>
+            <a:r>
+              <a:rPr lang="zh-CN" altLang="en-US" dirty="0"/>
+              <a:t>协议解码</a:t>
+            </a:r>
+          </a:p>
+        </p:txBody>
+      </p:sp>
+      <p:sp>
+        <p:nvSpPr>
+          <p:cNvPr id="15" name="矩形: 圆角 14">
+            <a:extLst>
+              <a:ext uri="{FF2B5EF4-FFF2-40B4-BE49-F238E27FC236}">
+                <a16:creationId xmlns:a16="http://schemas.microsoft.com/office/drawing/2014/main" id="{2A32BE5F-10E0-4DE1-881E-EF583805BDE7}"/>
+              </a:ext>
+            </a:extLst>
+          </p:cNvPr>
+          <p:cNvSpPr/>
+          <p:nvPr/>
+        </p:nvSpPr>
+        <p:spPr>
+          <a:xfrm>
+            <a:off x="7637739" y="5843203"/>
+            <a:ext cx="1654499" cy="418073"/>
+          </a:xfrm>
+          <a:prstGeom prst="roundRect">
+            <a:avLst/>
+          </a:prstGeom>
+          <a:solidFill>
+            <a:schemeClr val="accent2">
+              <a:alpha val="50000"/>
+            </a:schemeClr>
+          </a:solidFill>
+          <a:ln>
+            <a:noFill/>
+          </a:ln>
+        </p:spPr>
+        <p:style>
+          <a:lnRef idx="0">
+            <a:scrgbClr r="0" g="0" b="0"/>
+          </a:lnRef>
+          <a:fillRef idx="0">
+            <a:scrgbClr r="0" g="0" b="0"/>
+          </a:fillRef>
+          <a:effectRef idx="0">
+            <a:scrgbClr r="0" g="0" b="0"/>
+          </a:effectRef>
+          <a:fontRef idx="minor">
+            <a:schemeClr val="lt1"/>
+          </a:fontRef>
+        </p:style>
+        <p:txBody>
+          <a:bodyPr rtlCol="0" anchor="ctr"/>
+          <a:lstStyle/>
+          <a:p>
+            <a:pPr algn="ctr"/>
+            <a:r>
+              <a:rPr lang="zh-CN" altLang="en-US" dirty="0"/>
+              <a:t>网络传输</a:t>
+            </a:r>
           </a:p>
         </p:txBody>
       </p:sp>

</xml_diff>